<commit_message>
update week 6 hw
</commit_message>
<xml_diff>
--- a/course_material/week_06/week_06_presentation.pptx
+++ b/course_material/week_06/week_06_presentation.pptx
@@ -1848,7 +1848,7 @@
           <a:p>
             <a:fld id="{5CF9EFDB-215C-4120-ADCB-EAD745B7163E}" type="datetimeFigureOut">
               <a:rPr lang="en-US" smtClean="0"/>
-              <a:t>4/4/2021</a:t>
+              <a:t>4/7/2021</a:t>
             </a:fld>
             <a:endParaRPr lang="en-US"/>
           </a:p>
@@ -2309,7 +2309,7 @@
           <a:p>
             <a:fld id="{ACF1A1B0-862D-4909-A7DB-D8ADA062DFCA}" type="datetimeFigureOut">
               <a:rPr lang="en-US" dirty="0"/>
-              <a:t>4/4/2021</a:t>
+              <a:t>4/7/2021</a:t>
             </a:fld>
             <a:endParaRPr lang="en-US"/>
           </a:p>
@@ -2532,7 +2532,7 @@
           <a:p>
             <a:fld id="{7B156144-9CB7-4E3A-B87E-A382F9BE05EF}" type="datetimeFigureOut">
               <a:rPr lang="en-US" dirty="0"/>
-              <a:t>4/4/2021</a:t>
+              <a:t>4/7/2021</a:t>
             </a:fld>
             <a:endParaRPr lang="en-US"/>
           </a:p>
@@ -2710,7 +2710,7 @@
           <a:p>
             <a:fld id="{2643D55F-46AB-4791-9172-4FA8DD3A6A9C}" type="datetimeFigureOut">
               <a:rPr lang="en-US" dirty="0"/>
-              <a:t>4/4/2021</a:t>
+              <a:t>4/7/2021</a:t>
             </a:fld>
             <a:endParaRPr lang="en-US"/>
           </a:p>
@@ -2878,7 +2878,7 @@
           <a:p>
             <a:fld id="{58026881-8A08-449C-8D73-E5F201F814C1}" type="datetimeFigureOut">
               <a:rPr lang="en-US" dirty="0"/>
-              <a:t>4/4/2021</a:t>
+              <a:t>4/7/2021</a:t>
             </a:fld>
             <a:endParaRPr lang="en-US"/>
           </a:p>
@@ -3168,7 +3168,7 @@
           <a:p>
             <a:fld id="{1BEB5A5E-0C07-4E93-A112-D37B4D166B30}" type="datetimeFigureOut">
               <a:rPr lang="en-US" dirty="0"/>
-              <a:t>4/4/2021</a:t>
+              <a:t>4/7/2021</a:t>
             </a:fld>
             <a:endParaRPr lang="en-US"/>
           </a:p>
@@ -3491,7 +3491,7 @@
           <a:p>
             <a:fld id="{9E1F71C5-DC57-4358-A1EA-30C08AF6E3C5}" type="datetimeFigureOut">
               <a:rPr lang="en-US" dirty="0"/>
-              <a:t>4/4/2021</a:t>
+              <a:t>4/7/2021</a:t>
             </a:fld>
             <a:endParaRPr lang="en-US"/>
           </a:p>
@@ -3900,7 +3900,7 @@
           <a:p>
             <a:fld id="{12571DBA-DE60-4731-B773-47AAA185C143}" type="datetimeFigureOut">
               <a:rPr lang="en-US" dirty="0"/>
-              <a:t>4/4/2021</a:t>
+              <a:t>4/7/2021</a:t>
             </a:fld>
             <a:endParaRPr lang="en-US"/>
           </a:p>
@@ -4017,7 +4017,7 @@
           <a:p>
             <a:fld id="{4F170639-886C-4FCF-9EAB-ABB5DA3F3F4A}" type="datetimeFigureOut">
               <a:rPr lang="en-US" dirty="0"/>
-              <a:t>4/4/2021</a:t>
+              <a:t>4/7/2021</a:t>
             </a:fld>
             <a:endParaRPr lang="en-US"/>
           </a:p>
@@ -4112,7 +4112,7 @@
           <a:p>
             <a:fld id="{34C4A628-C83B-4C66-83F4-1711CE3738FD}" type="datetimeFigureOut">
               <a:rPr lang="en-US" dirty="0"/>
-              <a:t>4/4/2021</a:t>
+              <a:t>4/7/2021</a:t>
             </a:fld>
             <a:endParaRPr lang="en-US"/>
           </a:p>
@@ -4397,7 +4397,7 @@
           <a:p>
             <a:fld id="{B88C1D73-9400-43CA-A37F-F9B7D00DE14C}" type="datetimeFigureOut">
               <a:rPr lang="en-US" dirty="0"/>
-              <a:t>4/4/2021</a:t>
+              <a:t>4/7/2021</a:t>
             </a:fld>
             <a:endParaRPr lang="en-US"/>
           </a:p>
@@ -4669,7 +4669,7 @@
           <a:p>
             <a:fld id="{188B7711-B905-4633-B4D7-6F3A49A2E7D9}" type="datetimeFigureOut">
               <a:rPr lang="en-US" dirty="0"/>
-              <a:t>4/4/2021</a:t>
+              <a:t>4/7/2021</a:t>
             </a:fld>
             <a:endParaRPr lang="en-US"/>
           </a:p>
@@ -4919,7 +4919,7 @@
             <a:fld id="{89C235CF-BDA2-4E7E-8BBD-350479985E74}" type="datetimeFigureOut">
               <a:rPr lang="en-US" dirty="0"/>
               <a:pPr/>
-              <a:t>4/4/2021</a:t>
+              <a:t>4/7/2021</a:t>
             </a:fld>
             <a:endParaRPr lang="en-US"/>
           </a:p>
@@ -5998,13 +5998,14 @@
               <a:t>Attendance word: </a:t>
             </a:r>
             <a:r>
-              <a:rPr lang="en-US" b="1" dirty="0" err="1">
+              <a:rPr lang="en-US" b="0" i="0" dirty="0" err="1">
                 <a:solidFill>
                   <a:schemeClr val="tx1"/>
                 </a:solidFill>
+                <a:effectLst/>
                 <a:latin typeface="Slack-Lato"/>
               </a:rPr>
-              <a:t>GoogleGuru</a:t>
+              <a:t>DaringDesigner</a:t>
             </a:r>
             <a:endParaRPr lang="en-US" dirty="0">
               <a:solidFill>
@@ -7228,7 +7229,15 @@
             </a:r>
             <a:r>
               <a:rPr lang="en-US" dirty="0"/>
-              <a:t> that take the original dataset and groups the data by neighborhood and finds the average price, number of reviews, AND availability_365</a:t>
+              <a:t> that take the original dataset and groups the data by neighborhood and finds the average price, total number of reviews, </a:t>
+            </a:r>
+            <a:r>
+              <a:rPr lang="en-US"/>
+              <a:t>AND average </a:t>
+            </a:r>
+            <a:r>
+              <a:rPr lang="en-US" dirty="0"/>
+              <a:t>availability_365</a:t>
             </a:r>
           </a:p>
           <a:p>

</xml_diff>